<commit_message>
improve the final ppt
</commit_message>
<xml_diff>
--- a/FinalPRE/FinalPRE.pptx
+++ b/FinalPRE/FinalPRE.pptx
@@ -14,9 +14,9 @@
     <p:sldId id="286" r:id="rId5"/>
     <p:sldId id="288" r:id="rId6"/>
     <p:sldId id="270" r:id="rId7"/>
-    <p:sldId id="289" r:id="rId8"/>
-    <p:sldId id="290" r:id="rId9"/>
-    <p:sldId id="266" r:id="rId10"/>
+    <p:sldId id="290" r:id="rId8"/>
+    <p:sldId id="266" r:id="rId9"/>
+    <p:sldId id="289" r:id="rId10"/>
     <p:sldId id="291" r:id="rId11"/>
   </p:sldIdLst>
   <p:sldSz cx="12192000" cy="6858000"/>
@@ -220,7 +220,7 @@
           <a:p>
             <a:fld id="{DEE56F87-A81A-4EDE-81AE-3C76F245D5E1}" type="datetimeFigureOut">
               <a:rPr lang="zh-CN" altLang="en-US" smtClean="0"/>
-              <a:t>2018/5/6</a:t>
+              <a:t>2018/5/7</a:t>
             </a:fld>
             <a:endParaRPr lang="zh-CN" altLang="en-US"/>
           </a:p>
@@ -1150,7 +1150,7 @@
     </p:spTree>
     <p:extLst>
       <p:ext uri="{BB962C8B-B14F-4D97-AF65-F5344CB8AC3E}">
-        <p14:creationId xmlns:p14="http://schemas.microsoft.com/office/powerpoint/2010/main" val="3604548555"/>
+        <p14:creationId xmlns:p14="http://schemas.microsoft.com/office/powerpoint/2010/main" val="170272324"/>
       </p:ext>
     </p:extLst>
   </p:cSld>
@@ -1223,7 +1223,7 @@
           <a:bodyPr/>
           <a:lstStyle/>
           <a:p>
-            <a:fld id="{324DC7B0-EBAC-4569-9993-246641655C40}" type="slidenum">
+            <a:fld id="{C0227F45-547E-410F-8DF3-EC7ED5A73EEE}" type="slidenum">
               <a:rPr lang="zh-CN" altLang="en-US" smtClean="0"/>
               <a:t>8</a:t>
             </a:fld>
@@ -1234,7 +1234,7 @@
     </p:spTree>
     <p:extLst>
       <p:ext uri="{BB962C8B-B14F-4D97-AF65-F5344CB8AC3E}">
-        <p14:creationId xmlns:p14="http://schemas.microsoft.com/office/powerpoint/2010/main" val="170272324"/>
+        <p14:creationId xmlns:p14="http://schemas.microsoft.com/office/powerpoint/2010/main" val="105904844"/>
       </p:ext>
     </p:extLst>
   </p:cSld>
@@ -1307,7 +1307,7 @@
           <a:bodyPr/>
           <a:lstStyle/>
           <a:p>
-            <a:fld id="{C0227F45-547E-410F-8DF3-EC7ED5A73EEE}" type="slidenum">
+            <a:fld id="{324DC7B0-EBAC-4569-9993-246641655C40}" type="slidenum">
               <a:rPr lang="zh-CN" altLang="en-US" smtClean="0"/>
               <a:t>9</a:t>
             </a:fld>
@@ -1318,7 +1318,7 @@
     </p:spTree>
     <p:extLst>
       <p:ext uri="{BB962C8B-B14F-4D97-AF65-F5344CB8AC3E}">
-        <p14:creationId xmlns:p14="http://schemas.microsoft.com/office/powerpoint/2010/main" val="105904844"/>
+        <p14:creationId xmlns:p14="http://schemas.microsoft.com/office/powerpoint/2010/main" val="3604548555"/>
       </p:ext>
     </p:extLst>
   </p:cSld>
@@ -4001,8 +4001,8 @@
         </p:nvSpPr>
         <p:spPr>
           <a:xfrm>
-            <a:off x="2876355" y="1019243"/>
-            <a:ext cx="8488670" cy="1754326"/>
+            <a:off x="2285999" y="928960"/>
+            <a:ext cx="9623853" cy="1323439"/>
           </a:xfrm>
           <a:prstGeom prst="rect">
             <a:avLst/>
@@ -4021,7 +4021,7 @@
           <a:lstStyle/>
           <a:p>
             <a:r>
-              <a:rPr lang="en-US" altLang="zh-CN" sz="5400" b="1" smtClean="0">
+              <a:rPr lang="en-US" altLang="zh-CN" sz="4000" b="1" dirty="0" smtClean="0">
                 <a:solidFill>
                   <a:schemeClr val="accent1"/>
                 </a:solidFill>
@@ -4031,16 +4031,35 @@
             </a:r>
           </a:p>
           <a:p>
+            <a:pPr algn="ctr"/>
             <a:r>
-              <a:rPr lang="en-US" altLang="zh-CN" sz="5400" b="1" smtClean="0">
+              <a:rPr lang="en-US" altLang="zh-CN" sz="4000" b="1" dirty="0" smtClean="0">
                 <a:solidFill>
                   <a:schemeClr val="accent1"/>
                 </a:solidFill>
                 <a:latin typeface="Adobe Garamond Pro Bold" panose="02020702060506020403" pitchFamily="18" charset="0"/>
               </a:rPr>
-              <a:t>- Musier -</a:t>
+              <a:t>- </a:t>
             </a:r>
-            <a:endParaRPr lang="zh-CN" altLang="en-US" sz="5400" b="1" dirty="0">
+            <a:r>
+              <a:rPr lang="en-US" altLang="zh-CN" sz="4000" b="1" dirty="0" err="1" smtClean="0">
+                <a:solidFill>
+                  <a:schemeClr val="accent1"/>
+                </a:solidFill>
+                <a:latin typeface="Adobe Garamond Pro Bold" panose="02020702060506020403" pitchFamily="18" charset="0"/>
+              </a:rPr>
+              <a:t>Musier</a:t>
+            </a:r>
+            <a:r>
+              <a:rPr lang="en-US" altLang="zh-CN" sz="4000" b="1" dirty="0" smtClean="0">
+                <a:solidFill>
+                  <a:schemeClr val="accent1"/>
+                </a:solidFill>
+                <a:latin typeface="Adobe Garamond Pro Bold" panose="02020702060506020403" pitchFamily="18" charset="0"/>
+              </a:rPr>
+              <a:t> -</a:t>
+            </a:r>
+            <a:endParaRPr lang="zh-CN" altLang="en-US" sz="4000" b="1" dirty="0">
               <a:solidFill>
                 <a:schemeClr val="accent1"/>
               </a:solidFill>
@@ -4057,7 +4076,7 @@
         </p:nvSpPr>
         <p:spPr>
           <a:xfrm>
-            <a:off x="2966595" y="2773569"/>
+            <a:off x="2957542" y="3088245"/>
             <a:ext cx="5661144" cy="321370"/>
           </a:xfrm>
           <a:prstGeom prst="rect">
@@ -4082,7 +4101,7 @@
               </a:lnSpc>
             </a:pPr>
             <a:r>
-              <a:rPr lang="en-US" altLang="zh-CN" sz="1400" smtClean="0">
+              <a:rPr lang="en-US" altLang="zh-CN" sz="1400" dirty="0" smtClean="0">
                 <a:solidFill>
                   <a:schemeClr val="tx1">
                     <a:lumMod val="65000"/>
@@ -5857,7 +5876,7 @@
               <a:buChar char="•"/>
             </a:pPr>
             <a:r>
-              <a:rPr lang="en-US" altLang="zh-CN">
+              <a:rPr lang="en-US" altLang="zh-CN" dirty="0" smtClean="0">
                 <a:solidFill>
                   <a:schemeClr val="tx1">
                     <a:lumMod val="65000"/>
@@ -5868,35 +5887,9 @@
                 <a:ea typeface="MS UI Gothic" panose="020B0600070205080204" pitchFamily="34" charset="-128"/>
                 <a:cs typeface="Arial" charset="0"/>
               </a:rPr>
-              <a:t>Team#:</a:t>
+              <a:t>Team#10:</a:t>
             </a:r>
-          </a:p>
-          <a:p>
-            <a:pPr indent="-228600">
-              <a:lnSpc>
-                <a:spcPct val="90000"/>
-              </a:lnSpc>
-              <a:spcAft>
-                <a:spcPts val="600"/>
-              </a:spcAft>
-              <a:buFont typeface="Arial" panose="020B0604020202020204" pitchFamily="34" charset="0"/>
-              <a:buChar char="•"/>
-            </a:pPr>
-            <a:r>
-              <a:rPr lang="en-US" altLang="zh-CN">
-                <a:solidFill>
-                  <a:schemeClr val="tx1">
-                    <a:lumMod val="65000"/>
-                    <a:lumOff val="35000"/>
-                  </a:schemeClr>
-                </a:solidFill>
-                <a:latin typeface="Myriad Pro" panose="020B0503030403020204" pitchFamily="34" charset="0"/>
-                <a:ea typeface="MS UI Gothic" panose="020B0600070205080204" pitchFamily="34" charset="-128"/>
-                <a:cs typeface="Arial" charset="0"/>
-              </a:rPr>
-              <a:t>Zhang Ruoqing   115010096</a:t>
-            </a:r>
-            <a:endParaRPr lang="en-US">
+            <a:endParaRPr lang="en-US" altLang="zh-CN" dirty="0">
               <a:solidFill>
                 <a:schemeClr val="tx1">
                   <a:lumMod val="65000"/>
@@ -5920,7 +5913,7 @@
               <a:buChar char="•"/>
             </a:pPr>
             <a:r>
-              <a:rPr lang="en-US">
+              <a:rPr lang="en-US" altLang="zh-CN" dirty="0">
                 <a:solidFill>
                   <a:schemeClr val="tx1">
                     <a:lumMod val="65000"/>
@@ -5931,7 +5924,100 @@
                 <a:ea typeface="MS UI Gothic" panose="020B0600070205080204" pitchFamily="34" charset="-128"/>
                 <a:cs typeface="Arial" charset="0"/>
               </a:rPr>
-              <a:t>Li Kengjie   115010177</a:t>
+              <a:t>Zhang </a:t>
+            </a:r>
+            <a:r>
+              <a:rPr lang="en-US" altLang="zh-CN" dirty="0" err="1">
+                <a:solidFill>
+                  <a:schemeClr val="tx1">
+                    <a:lumMod val="65000"/>
+                    <a:lumOff val="35000"/>
+                  </a:schemeClr>
+                </a:solidFill>
+                <a:latin typeface="Myriad Pro" panose="020B0503030403020204" pitchFamily="34" charset="0"/>
+                <a:ea typeface="MS UI Gothic" panose="020B0600070205080204" pitchFamily="34" charset="-128"/>
+                <a:cs typeface="Arial" charset="0"/>
+              </a:rPr>
+              <a:t>Ruoqing</a:t>
+            </a:r>
+            <a:r>
+              <a:rPr lang="en-US" altLang="zh-CN" dirty="0">
+                <a:solidFill>
+                  <a:schemeClr val="tx1">
+                    <a:lumMod val="65000"/>
+                    <a:lumOff val="35000"/>
+                  </a:schemeClr>
+                </a:solidFill>
+                <a:latin typeface="Myriad Pro" panose="020B0503030403020204" pitchFamily="34" charset="0"/>
+                <a:ea typeface="MS UI Gothic" panose="020B0600070205080204" pitchFamily="34" charset="-128"/>
+                <a:cs typeface="Arial" charset="0"/>
+              </a:rPr>
+              <a:t>   115010096</a:t>
+            </a:r>
+            <a:endParaRPr lang="en-US" dirty="0">
+              <a:solidFill>
+                <a:schemeClr val="tx1">
+                  <a:lumMod val="65000"/>
+                  <a:lumOff val="35000"/>
+                </a:schemeClr>
+              </a:solidFill>
+              <a:latin typeface="Myriad Pro" panose="020B0503030403020204" pitchFamily="34" charset="0"/>
+              <a:ea typeface="MS UI Gothic" panose="020B0600070205080204" pitchFamily="34" charset="-128"/>
+              <a:cs typeface="Arial" charset="0"/>
+            </a:endParaRPr>
+          </a:p>
+          <a:p>
+            <a:pPr indent="-228600">
+              <a:lnSpc>
+                <a:spcPct val="90000"/>
+              </a:lnSpc>
+              <a:spcAft>
+                <a:spcPts val="600"/>
+              </a:spcAft>
+              <a:buFont typeface="Arial" panose="020B0604020202020204" pitchFamily="34" charset="0"/>
+              <a:buChar char="•"/>
+            </a:pPr>
+            <a:r>
+              <a:rPr lang="en-US" dirty="0">
+                <a:solidFill>
+                  <a:schemeClr val="tx1">
+                    <a:lumMod val="65000"/>
+                    <a:lumOff val="35000"/>
+                  </a:schemeClr>
+                </a:solidFill>
+                <a:latin typeface="Myriad Pro" panose="020B0503030403020204" pitchFamily="34" charset="0"/>
+                <a:ea typeface="MS UI Gothic" panose="020B0600070205080204" pitchFamily="34" charset="-128"/>
+                <a:cs typeface="Arial" charset="0"/>
+              </a:rPr>
+              <a:t>Li </a:t>
+            </a:r>
+            <a:r>
+              <a:rPr lang="en-US" dirty="0" err="1">
+                <a:solidFill>
+                  <a:schemeClr val="tx1">
+                    <a:lumMod val="65000"/>
+                    <a:lumOff val="35000"/>
+                  </a:schemeClr>
+                </a:solidFill>
+                <a:latin typeface="Myriad Pro" panose="020B0503030403020204" pitchFamily="34" charset="0"/>
+                <a:ea typeface="MS UI Gothic" panose="020B0600070205080204" pitchFamily="34" charset="-128"/>
+                <a:cs typeface="Arial" charset="0"/>
+              </a:rPr>
+              <a:t>Kengjie</a:t>
+            </a:r>
+            <a:r>
+              <a:rPr lang="en-US" dirty="0">
+                <a:solidFill>
+                  <a:schemeClr val="tx1">
+                    <a:lumMod val="65000"/>
+                    <a:lumOff val="35000"/>
+                  </a:schemeClr>
+                </a:solidFill>
+                <a:latin typeface="Myriad Pro" panose="020B0503030403020204" pitchFamily="34" charset="0"/>
+                <a:ea typeface="MS UI Gothic" panose="020B0600070205080204" pitchFamily="34" charset="-128"/>
+                <a:cs typeface="Arial" charset="0"/>
+              </a:rPr>
+              <a:t>   115010177</a:t>
             </a:r>
           </a:p>
           <a:p>
@@ -5946,7 +6032,7 @@
               <a:buChar char="•"/>
             </a:pPr>
             <a:r>
-              <a:rPr lang="en-US">
+              <a:rPr lang="en-US" dirty="0">
                 <a:solidFill>
                   <a:schemeClr val="tx1">
                     <a:lumMod val="65000"/>
@@ -5957,7 +6043,35 @@
                 <a:ea typeface="MS UI Gothic" panose="020B0600070205080204" pitchFamily="34" charset="-128"/>
                 <a:cs typeface="Arial" charset="0"/>
               </a:rPr>
-              <a:t>Ye Shuqian   115010269</a:t>
+              <a:t>Ye </a:t>
+            </a:r>
+            <a:r>
+              <a:rPr lang="en-US" dirty="0" err="1">
+                <a:solidFill>
+                  <a:schemeClr val="tx1">
+                    <a:lumMod val="65000"/>
+                    <a:lumOff val="35000"/>
+                  </a:schemeClr>
+                </a:solidFill>
+                <a:latin typeface="Myriad Pro" panose="020B0503030403020204" pitchFamily="34" charset="0"/>
+                <a:ea typeface="MS UI Gothic" panose="020B0600070205080204" pitchFamily="34" charset="-128"/>
+                <a:cs typeface="Arial" charset="0"/>
+              </a:rPr>
+              <a:t>Shuqian</a:t>
+            </a:r>
+            <a:r>
+              <a:rPr lang="en-US" dirty="0">
+                <a:solidFill>
+                  <a:schemeClr val="tx1">
+                    <a:lumMod val="65000"/>
+                    <a:lumOff val="35000"/>
+                  </a:schemeClr>
+                </a:solidFill>
+                <a:latin typeface="Myriad Pro" panose="020B0503030403020204" pitchFamily="34" charset="0"/>
+                <a:ea typeface="MS UI Gothic" panose="020B0600070205080204" pitchFamily="34" charset="-128"/>
+                <a:cs typeface="Arial" charset="0"/>
+              </a:rPr>
+              <a:t>   115010269</a:t>
             </a:r>
           </a:p>
           <a:p>
@@ -5972,7 +6086,7 @@
               <a:buChar char="•"/>
             </a:pPr>
             <a:r>
-              <a:rPr lang="en-US" altLang="zh-CN">
+              <a:rPr lang="en-US" altLang="zh-CN" dirty="0">
                 <a:solidFill>
                   <a:schemeClr val="tx1">
                     <a:lumMod val="65000"/>
@@ -5998,7 +6112,7 @@
               <a:buChar char="•"/>
             </a:pPr>
             <a:r>
-              <a:rPr lang="en-US">
+              <a:rPr lang="en-US" dirty="0">
                 <a:solidFill>
                   <a:schemeClr val="tx1">
                     <a:lumMod val="65000"/>
@@ -6009,19 +6123,36 @@
                 <a:ea typeface="MS UI Gothic" panose="020B0600070205080204" pitchFamily="34" charset="-128"/>
                 <a:cs typeface="Arial" charset="0"/>
               </a:rPr>
-              <a:t>Wang Junce   115010231</a:t>
+              <a:t>Wang </a:t>
             </a:r>
-            <a:endParaRPr lang="en-US" dirty="0">
-              <a:solidFill>
-                <a:schemeClr val="tx1">
-                  <a:lumMod val="65000"/>
-                  <a:lumOff val="35000"/>
-                </a:schemeClr>
-              </a:solidFill>
-              <a:latin typeface="Myriad Pro" panose="020B0503030403020204" pitchFamily="34" charset="0"/>
-              <a:ea typeface="MS UI Gothic" panose="020B0600070205080204" pitchFamily="34" charset="-128"/>
-              <a:cs typeface="Arial" charset="0"/>
-            </a:endParaRPr>
+            <a:r>
+              <a:rPr lang="en-US" dirty="0" err="1">
+                <a:solidFill>
+                  <a:schemeClr val="tx1">
+                    <a:lumMod val="65000"/>
+                    <a:lumOff val="35000"/>
+                  </a:schemeClr>
+                </a:solidFill>
+                <a:latin typeface="Myriad Pro" panose="020B0503030403020204" pitchFamily="34" charset="0"/>
+                <a:ea typeface="MS UI Gothic" panose="020B0600070205080204" pitchFamily="34" charset="-128"/>
+                <a:cs typeface="Arial" charset="0"/>
+              </a:rPr>
+              <a:t>Junce</a:t>
+            </a:r>
+            <a:r>
+              <a:rPr lang="en-US" dirty="0">
+                <a:solidFill>
+                  <a:schemeClr val="tx1">
+                    <a:lumMod val="65000"/>
+                    <a:lumOff val="35000"/>
+                  </a:schemeClr>
+                </a:solidFill>
+                <a:latin typeface="Myriad Pro" panose="020B0503030403020204" pitchFamily="34" charset="0"/>
+                <a:ea typeface="MS UI Gothic" panose="020B0600070205080204" pitchFamily="34" charset="-128"/>
+                <a:cs typeface="Arial" charset="0"/>
+              </a:rPr>
+              <a:t>   115010231</a:t>
+            </a:r>
           </a:p>
         </p:txBody>
       </p:sp>
@@ -6162,8 +6293,8 @@
         </p:nvSpPr>
         <p:spPr>
           <a:xfrm>
-            <a:off x="2876355" y="1329070"/>
-            <a:ext cx="6958956" cy="923330"/>
+            <a:off x="2324094" y="1011132"/>
+            <a:ext cx="8994770" cy="769441"/>
           </a:xfrm>
           <a:prstGeom prst="rect">
             <a:avLst/>
@@ -6182,7 +6313,7 @@
           <a:lstStyle/>
           <a:p>
             <a:r>
-              <a:rPr lang="en-US" altLang="zh-CN" sz="5400" b="1" smtClean="0">
+              <a:rPr lang="en-US" altLang="zh-CN" sz="4400" b="1" dirty="0" smtClean="0">
                 <a:solidFill>
                   <a:schemeClr val="accent1"/>
                 </a:solidFill>
@@ -6190,12 +6321,6 @@
               </a:rPr>
               <a:t>Thanks all for listening!</a:t>
             </a:r>
-            <a:endParaRPr lang="en-US" altLang="zh-CN" sz="5400" b="1" smtClean="0">
-              <a:solidFill>
-                <a:schemeClr val="accent1"/>
-              </a:solidFill>
-              <a:latin typeface="Adobe Garamond Pro Bold" panose="02020702060506020403" pitchFamily="18" charset="0"/>
-            </a:endParaRPr>
           </a:p>
         </p:txBody>
       </p:sp>
@@ -6207,7 +6332,7 @@
         </p:nvSpPr>
         <p:spPr>
           <a:xfrm>
-            <a:off x="2966595" y="2252400"/>
+            <a:off x="2891357" y="1633416"/>
             <a:ext cx="5661144" cy="321370"/>
           </a:xfrm>
           <a:prstGeom prst="rect">
@@ -6232,7 +6357,7 @@
               </a:lnSpc>
             </a:pPr>
             <a:r>
-              <a:rPr lang="en-US" altLang="zh-CN" sz="1400" smtClean="0">
+              <a:rPr lang="en-US" altLang="zh-CN" sz="1400" dirty="0" smtClean="0">
                 <a:solidFill>
                   <a:schemeClr val="tx1">
                     <a:lumMod val="65000"/>
@@ -8005,13 +8130,31 @@
               </a:spcAft>
             </a:pPr>
             <a:r>
-              <a:rPr lang="en-US" altLang="zh-CN" sz="5400" b="1" smtClean="0">
+              <a:rPr lang="en-US" altLang="zh-CN" sz="5400" b="1" dirty="0" smtClean="0">
                 <a:solidFill>
                   <a:schemeClr val="accent1"/>
                 </a:solidFill>
                 <a:latin typeface="Adobe Garamond Pro Bold" panose="02020702060506020403" pitchFamily="18" charset="0"/>
               </a:rPr>
-              <a:t> - Musier -</a:t>
+              <a:t> - </a:t>
+            </a:r>
+            <a:r>
+              <a:rPr lang="en-US" altLang="zh-CN" sz="5400" b="1" dirty="0" err="1" smtClean="0">
+                <a:solidFill>
+                  <a:schemeClr val="accent1"/>
+                </a:solidFill>
+                <a:latin typeface="Adobe Garamond Pro Bold" panose="02020702060506020403" pitchFamily="18" charset="0"/>
+              </a:rPr>
+              <a:t>Musier</a:t>
+            </a:r>
+            <a:r>
+              <a:rPr lang="en-US" altLang="zh-CN" sz="5400" b="1" dirty="0" smtClean="0">
+                <a:solidFill>
+                  <a:schemeClr val="accent1"/>
+                </a:solidFill>
+                <a:latin typeface="Adobe Garamond Pro Bold" panose="02020702060506020403" pitchFamily="18" charset="0"/>
+              </a:rPr>
+              <a:t> -</a:t>
             </a:r>
           </a:p>
           <a:p>
@@ -8024,7 +8167,7 @@
               </a:spcAft>
             </a:pPr>
             <a:r>
-              <a:rPr lang="en-US" altLang="zh-CN" sz="4000" b="1" smtClean="0">
+              <a:rPr lang="en-US" altLang="zh-CN" sz="4000" b="1" dirty="0" smtClean="0">
                 <a:solidFill>
                   <a:schemeClr val="accent1"/>
                 </a:solidFill>
@@ -8244,7 +8387,7 @@
         <p:spPr>
           <a:xfrm>
             <a:off x="1521930" y="1292069"/>
-            <a:ext cx="3039615" cy="4031873"/>
+            <a:ext cx="3265638" cy="4031873"/>
           </a:xfrm>
           <a:prstGeom prst="rect">
             <a:avLst/>
@@ -8268,7 +8411,7 @@
               <a:buAutoNum type="arabicPeriod"/>
             </a:pPr>
             <a:r>
-              <a:rPr lang="en-US" altLang="zh-CN" sz="3200" b="1" smtClean="0">
+              <a:rPr lang="en-US" altLang="zh-CN" sz="3200" b="1" dirty="0" smtClean="0">
                 <a:solidFill>
                   <a:schemeClr val="accent6"/>
                 </a:solidFill>
@@ -8291,7 +8434,7 @@
               <a:buAutoNum type="arabicPeriod"/>
             </a:pPr>
             <a:r>
-              <a:rPr lang="en-US" altLang="zh-CN" sz="3200" b="1" smtClean="0">
+              <a:rPr lang="en-US" altLang="zh-CN" sz="3200" b="1" dirty="0" smtClean="0">
                 <a:solidFill>
                   <a:schemeClr val="accent6"/>
                 </a:solidFill>
@@ -8308,14 +8451,20 @@
               <a:buAutoNum type="arabicPeriod"/>
             </a:pPr>
             <a:r>
-              <a:rPr lang="en-US" altLang="zh-CN" sz="3200" b="1" smtClean="0">
+              <a:rPr lang="en-US" altLang="zh-CN" sz="3200" b="1" dirty="0" smtClean="0">
                 <a:solidFill>
                   <a:schemeClr val="accent6"/>
                 </a:solidFill>
                 <a:latin typeface="Garamond" panose="02020404030301010803" pitchFamily="18" charset="0"/>
               </a:rPr>
-              <a:t>Demostration</a:t>
+              <a:t>Development</a:t>
             </a:r>
+            <a:endParaRPr lang="en-US" altLang="zh-CN" sz="3200" b="1" dirty="0" smtClean="0">
+              <a:solidFill>
+                <a:schemeClr val="accent6"/>
+              </a:solidFill>
+              <a:latin typeface="Garamond" panose="02020404030301010803" pitchFamily="18" charset="0"/>
+            </a:endParaRPr>
           </a:p>
           <a:p>
             <a:pPr marL="457200" indent="-457200">
@@ -8325,14 +8474,20 @@
               <a:buAutoNum type="arabicPeriod"/>
             </a:pPr>
             <a:r>
-              <a:rPr lang="en-US" altLang="zh-CN" sz="3200" b="1" smtClean="0">
+              <a:rPr lang="en-US" altLang="zh-CN" sz="3200" b="1">
                 <a:solidFill>
                   <a:schemeClr val="accent6"/>
                 </a:solidFill>
                 <a:latin typeface="Garamond" panose="02020404030301010803" pitchFamily="18" charset="0"/>
               </a:rPr>
-              <a:t>Development</a:t>
+              <a:t>Demonstration</a:t>
             </a:r>
+            <a:endParaRPr lang="en-US" altLang="zh-CN" sz="3200" b="1" dirty="0" smtClean="0">
+              <a:solidFill>
+                <a:schemeClr val="accent6"/>
+              </a:solidFill>
+              <a:latin typeface="Garamond" panose="02020404030301010803" pitchFamily="18" charset="0"/>
+            </a:endParaRPr>
           </a:p>
         </p:txBody>
       </p:sp>
@@ -8898,16 +9053,7 @@
                 </a:solidFill>
                 <a:latin typeface="Garamond" panose="02020404030301010803" pitchFamily="18" charset="0"/>
               </a:rPr>
-              <a:t>01</a:t>
-            </a:r>
-            <a:r>
-              <a:rPr lang="en-US" altLang="zh-CN" sz="2800" b="1" smtClean="0">
-                <a:solidFill>
-                  <a:schemeClr val="accent6"/>
-                </a:solidFill>
-                <a:latin typeface="Garamond" panose="02020404030301010803" pitchFamily="18" charset="0"/>
-              </a:rPr>
-              <a:t>. Introduction</a:t>
+              <a:t>01. Introduction</a:t>
             </a:r>
             <a:endParaRPr lang="zh-CN" altLang="en-US" sz="2800" b="1" dirty="0">
               <a:solidFill>
@@ -8947,8 +9093,8 @@
         </p:blipFill>
         <p:spPr bwMode="auto">
           <a:xfrm>
-            <a:off x="5895891" y="81661"/>
-            <a:ext cx="5808430" cy="6470454"/>
+            <a:off x="5646198" y="-196491"/>
+            <a:ext cx="6409678" cy="7140230"/>
           </a:xfrm>
           <a:prstGeom prst="rect">
             <a:avLst/>
@@ -9004,7 +9150,7 @@
           <a:lstStyle/>
           <a:p>
             <a:r>
-              <a:rPr lang="en-US" sz="2000" smtClean="0">
+              <a:rPr lang="en-US" sz="2000" dirty="0" smtClean="0">
                 <a:solidFill>
                   <a:schemeClr val="accent1"/>
                 </a:solidFill>
@@ -9013,25 +9159,16 @@
               <a:t>“The </a:t>
             </a:r>
             <a:r>
-              <a:rPr lang="en-US" sz="2000">
+              <a:rPr lang="en-US" sz="2000" dirty="0">
                 <a:solidFill>
                   <a:schemeClr val="accent1"/>
                 </a:solidFill>
                 <a:latin typeface="Myriad Pro" panose="020B0503030403020204" pitchFamily="34" charset="0"/>
               </a:rPr>
-              <a:t>automatic melody generator provides the amateur users with the opportunity to compose pieces of </a:t>
+              <a:t>automatic melody generator provides the amateur users with the opportunity to compose pieces of melody</a:t>
             </a:r>
             <a:r>
-              <a:rPr lang="en-US" sz="2000">
-                <a:solidFill>
-                  <a:schemeClr val="accent1"/>
-                </a:solidFill>
-                <a:latin typeface="Myriad Pro" panose="020B0503030403020204" pitchFamily="34" charset="0"/>
-              </a:rPr>
-              <a:t>melody</a:t>
-            </a:r>
-            <a:r>
-              <a:rPr lang="en-US" sz="2000" smtClean="0">
+              <a:rPr lang="en-US" sz="2000" dirty="0" smtClean="0">
                 <a:solidFill>
                   <a:schemeClr val="accent1"/>
                 </a:solidFill>
@@ -9041,7 +9178,7 @@
             </a:r>
           </a:p>
           <a:p>
-            <a:endParaRPr lang="en-US" sz="2000">
+            <a:endParaRPr lang="en-US" sz="2000" dirty="0">
               <a:solidFill>
                 <a:schemeClr val="accent1"/>
               </a:solidFill>
@@ -9050,34 +9187,16 @@
           </a:p>
           <a:p>
             <a:r>
-              <a:rPr lang="en-US" sz="2000">
+              <a:rPr lang="en-US" sz="2000" dirty="0">
                 <a:solidFill>
                   <a:schemeClr val="accent1"/>
                 </a:solidFill>
                 <a:latin typeface="Myriad Pro" panose="020B0503030403020204" pitchFamily="34" charset="0"/>
               </a:rPr>
-              <a:t>Some </a:t>
+              <a:t>Some amateurs may have the dream being composers, but lack professional knowledge</a:t>
             </a:r>
             <a:r>
-              <a:rPr lang="en-US" sz="2000">
-                <a:solidFill>
-                  <a:schemeClr val="accent1"/>
-                </a:solidFill>
-                <a:latin typeface="Myriad Pro" panose="020B0503030403020204" pitchFamily="34" charset="0"/>
-              </a:rPr>
-              <a:t>amateurs may have the dream being composers, but lack professional </a:t>
-            </a:r>
-            <a:r>
-              <a:rPr lang="en-US" sz="2000">
-                <a:solidFill>
-                  <a:schemeClr val="accent1"/>
-                </a:solidFill>
-                <a:latin typeface="Myriad Pro" panose="020B0503030403020204" pitchFamily="34" charset="0"/>
-              </a:rPr>
-              <a:t>knowledge</a:t>
-            </a:r>
-            <a:r>
-              <a:rPr lang="en-US" sz="2000" smtClean="0">
+              <a:rPr lang="en-US" sz="2000" dirty="0" smtClean="0">
                 <a:solidFill>
                   <a:schemeClr val="accent1"/>
                 </a:solidFill>
@@ -9088,7 +9207,7 @@
           </a:p>
           <a:p>
             <a:r>
-              <a:rPr lang="en-US" sz="2000">
+              <a:rPr lang="en-US" sz="2000" dirty="0">
                 <a:solidFill>
                   <a:schemeClr val="accent1"/>
                 </a:solidFill>
@@ -9097,7 +9216,7 @@
               <a:t/>
             </a:r>
             <a:br>
-              <a:rPr lang="en-US" sz="2000">
+              <a:rPr lang="en-US" sz="2000" dirty="0">
                 <a:solidFill>
                   <a:schemeClr val="accent1"/>
                 </a:solidFill>
@@ -9105,7 +9224,7 @@
               </a:rPr>
             </a:br>
             <a:r>
-              <a:rPr lang="en-US" sz="2000">
+              <a:rPr lang="en-US" sz="2000" dirty="0">
                 <a:solidFill>
                   <a:schemeClr val="accent1"/>
                 </a:solidFill>
@@ -9114,7 +9233,7 @@
               <a:t>If you are the one who wants to be a composer, but feeling puzzled with the complex commands,</a:t>
             </a:r>
             <a:br>
-              <a:rPr lang="en-US" sz="2000">
+              <a:rPr lang="en-US" sz="2000" dirty="0">
                 <a:solidFill>
                   <a:schemeClr val="accent1"/>
                 </a:solidFill>
@@ -9122,22 +9241,49 @@
               </a:rPr>
             </a:br>
             <a:r>
-              <a:rPr lang="en-US" sz="2000">
+              <a:rPr lang="en-US" sz="2000" dirty="0" err="1">
                 <a:solidFill>
                   <a:schemeClr val="accent1"/>
                 </a:solidFill>
                 <a:latin typeface="Myriad Pro" panose="020B0503030403020204" pitchFamily="34" charset="0"/>
               </a:rPr>
-              <a:t>Musier is the one can do you a favour!</a:t>
+              <a:t>Musier</a:t>
             </a:r>
             <a:r>
-              <a:rPr lang="en-US" sz="2000"/>
+              <a:rPr lang="en-US" sz="2000" dirty="0">
+                <a:solidFill>
+                  <a:schemeClr val="accent1"/>
+                </a:solidFill>
+                <a:latin typeface="Myriad Pro" panose="020B0503030403020204" pitchFamily="34" charset="0"/>
+              </a:rPr>
+              <a:t> is the one can do you a </a:t>
+            </a:r>
+            <a:r>
+              <a:rPr lang="en-US" sz="2000" dirty="0" err="1">
+                <a:solidFill>
+                  <a:schemeClr val="accent1"/>
+                </a:solidFill>
+                <a:latin typeface="Myriad Pro" panose="020B0503030403020204" pitchFamily="34" charset="0"/>
+              </a:rPr>
+              <a:t>favour</a:t>
+            </a:r>
+            <a:r>
+              <a:rPr lang="en-US" sz="2000" dirty="0">
+                <a:solidFill>
+                  <a:schemeClr val="accent1"/>
+                </a:solidFill>
+                <a:latin typeface="Myriad Pro" panose="020B0503030403020204" pitchFamily="34" charset="0"/>
+              </a:rPr>
+              <a:t>!</a:t>
+            </a:r>
+            <a:r>
+              <a:rPr lang="en-US" sz="2000" dirty="0"/>
               <a:t/>
             </a:r>
             <a:br>
-              <a:rPr lang="en-US" sz="2000"/>
+              <a:rPr lang="en-US" sz="2000" dirty="0"/>
             </a:br>
-            <a:endParaRPr lang="en-US" sz="2400" b="1">
+            <a:endParaRPr lang="en-US" sz="2400" b="1" dirty="0">
               <a:solidFill>
                 <a:schemeClr val="accent6"/>
               </a:solidFill>
@@ -9308,16 +9454,7 @@
                   </a:solidFill>
                   <a:latin typeface="Garamond" panose="02020404030301010803" pitchFamily="18" charset="0"/>
                 </a:rPr>
-                <a:t>PART </a:t>
-              </a:r>
-              <a:r>
-                <a:rPr lang="en-US" altLang="zh-CN" sz="5400" b="1" smtClean="0">
-                  <a:solidFill>
-                    <a:schemeClr val="accent1"/>
-                  </a:solidFill>
-                  <a:latin typeface="Garamond" panose="02020404030301010803" pitchFamily="18" charset="0"/>
-                </a:rPr>
-                <a:t>02</a:t>
+                <a:t>PART 02</a:t>
               </a:r>
               <a:endParaRPr lang="zh-CN" altLang="en-US" sz="5400" b="1" dirty="0">
                 <a:solidFill>
@@ -9790,7 +9927,7 @@
         <p:spPr>
           <a:xfrm>
             <a:off x="2619290" y="2949255"/>
-            <a:ext cx="4017909" cy="369332"/>
+            <a:ext cx="4017909" cy="430887"/>
           </a:xfrm>
           <a:prstGeom prst="rect">
             <a:avLst/>
@@ -9843,12 +9980,12 @@
           </a:lstStyle>
           <a:p>
             <a:r>
-              <a:rPr lang="en-US" altLang="zh-CN" smtClean="0">
+              <a:rPr lang="en-US" altLang="zh-CN" sz="2200" dirty="0" smtClean="0">
                 <a:latin typeface="Myriad Pro" panose="020B0503030403020204" pitchFamily="34" charset="0"/>
               </a:rPr>
               <a:t>Simulated Annealing Algorithm</a:t>
             </a:r>
-            <a:endParaRPr lang="zh-CN" altLang="en-US" dirty="0">
+            <a:endParaRPr lang="zh-CN" altLang="en-US" sz="2200" dirty="0">
               <a:latin typeface="Myriad Pro" panose="020B0503030403020204" pitchFamily="34" charset="0"/>
             </a:endParaRPr>
           </a:p>
@@ -9862,8 +9999,8 @@
         </p:nvSpPr>
         <p:spPr>
           <a:xfrm>
-            <a:off x="8629798" y="2924677"/>
-            <a:ext cx="2241974" cy="369332"/>
+            <a:off x="8472968" y="2926027"/>
+            <a:ext cx="2591577" cy="430887"/>
           </a:xfrm>
           <a:prstGeom prst="rect">
             <a:avLst/>
@@ -9916,12 +10053,12 @@
           </a:lstStyle>
           <a:p>
             <a:r>
-              <a:rPr lang="en-US" altLang="zh-CN" smtClean="0">
+              <a:rPr lang="en-US" altLang="zh-CN" sz="2200" dirty="0" smtClean="0">
                 <a:latin typeface="Myriad Pro" panose="020B0503030403020204" pitchFamily="34" charset="0"/>
               </a:rPr>
               <a:t>Genetic Algorithm</a:t>
             </a:r>
-            <a:endParaRPr lang="zh-CN" altLang="en-US" dirty="0">
+            <a:endParaRPr lang="zh-CN" altLang="en-US" sz="2200" dirty="0">
               <a:latin typeface="Myriad Pro" panose="020B0503030403020204" pitchFamily="34" charset="0"/>
             </a:endParaRPr>
           </a:p>
@@ -9936,7 +10073,7 @@
         <p:spPr>
           <a:xfrm>
             <a:off x="6387823" y="4618456"/>
-            <a:ext cx="2241974" cy="369332"/>
+            <a:ext cx="2241974" cy="430887"/>
           </a:xfrm>
           <a:prstGeom prst="rect">
             <a:avLst/>
@@ -9989,12 +10126,18 @@
           </a:lstStyle>
           <a:p>
             <a:r>
-              <a:rPr lang="en-US" altLang="zh-CN" smtClean="0">
+              <a:rPr lang="en-US" altLang="zh-CN" sz="2200" dirty="0" err="1" smtClean="0">
                 <a:latin typeface="Myriad Pro" panose="020B0503030403020204" pitchFamily="34" charset="0"/>
               </a:rPr>
-              <a:t>Abc Notion</a:t>
+              <a:t>Abc</a:t>
             </a:r>
-            <a:endParaRPr lang="zh-CN" altLang="en-US" dirty="0">
+            <a:r>
+              <a:rPr lang="en-US" altLang="zh-CN" sz="2200" dirty="0" smtClean="0">
+                <a:latin typeface="Myriad Pro" panose="020B0503030403020204" pitchFamily="34" charset="0"/>
+              </a:rPr>
+              <a:t> Notion</a:t>
+            </a:r>
+            <a:endParaRPr lang="zh-CN" altLang="en-US" sz="2200" dirty="0">
               <a:latin typeface="Myriad Pro" panose="020B0503030403020204" pitchFamily="34" charset="0"/>
             </a:endParaRPr>
           </a:p>
@@ -10032,13 +10175,13 @@
               </a:lnSpc>
             </a:pPr>
             <a:r>
-              <a:rPr lang="en-US" altLang="zh-CN" sz="2400" b="1" smtClean="0">
+              <a:rPr lang="en-US" altLang="zh-CN" sz="2400" b="1" dirty="0" smtClean="0">
                 <a:solidFill>
                   <a:schemeClr val="bg1"/>
                 </a:solidFill>
                 <a:latin typeface="Garamond" panose="02020404030301010803" pitchFamily="18" charset="0"/>
               </a:rPr>
-              <a:t>Backend</a:t>
+              <a:t>Back end</a:t>
             </a:r>
             <a:endParaRPr lang="zh-CN" altLang="en-US" sz="2400" b="1" dirty="0">
               <a:solidFill>
@@ -10081,53 +10224,47 @@
               </a:lnSpc>
             </a:pPr>
             <a:r>
-              <a:rPr lang="en-US">
+              <a:rPr lang="en-US" dirty="0">
                 <a:latin typeface="Myriad Pro" panose="020B0503030403020204" pitchFamily="34" charset="0"/>
               </a:rPr>
               <a:t>It is applied to generate "UNIT"s.</a:t>
             </a:r>
             <a:r>
-              <a:rPr lang="en-US" sz="1400">
+              <a:rPr lang="en-US" sz="1400" dirty="0">
                 <a:latin typeface="Myriad Pro" panose="020B0503030403020204" pitchFamily="34" charset="0"/>
               </a:rPr>
               <a:t/>
             </a:r>
             <a:br>
-              <a:rPr lang="en-US" sz="1400">
+              <a:rPr lang="en-US" sz="1400" dirty="0">
                 <a:latin typeface="Myriad Pro" panose="020B0503030403020204" pitchFamily="34" charset="0"/>
               </a:rPr>
             </a:br>
             <a:r>
-              <a:rPr lang="en-US">
+              <a:rPr lang="en-US" dirty="0">
                 <a:latin typeface="Myriad Pro" panose="020B0503030403020204" pitchFamily="34" charset="0"/>
               </a:rPr>
               <a:t>The combination of these two</a:t>
             </a:r>
             <a:r>
-              <a:rPr lang="en-US" sz="1400">
+              <a:rPr lang="en-US" sz="1400" dirty="0">
                 <a:latin typeface="Myriad Pro" panose="020B0503030403020204" pitchFamily="34" charset="0"/>
               </a:rPr>
               <a:t/>
             </a:r>
             <a:br>
-              <a:rPr lang="en-US" sz="1400">
+              <a:rPr lang="en-US" sz="1400" dirty="0">
                 <a:latin typeface="Myriad Pro" panose="020B0503030403020204" pitchFamily="34" charset="0"/>
               </a:rPr>
             </a:br>
             <a:r>
-              <a:rPr lang="en-US">
+              <a:rPr lang="en-US" dirty="0">
                 <a:latin typeface="Myriad Pro" panose="020B0503030403020204" pitchFamily="34" charset="0"/>
               </a:rPr>
-              <a:t>are better than </a:t>
+              <a:t>are better than Markov </a:t>
             </a:r>
             <a:r>
-              <a:rPr lang="en-US">
-                <a:latin typeface="Myriad Pro" panose="020B0503030403020204" pitchFamily="34" charset="0"/>
-              </a:rPr>
-              <a:t>Markov </a:t>
-            </a:r>
-            <a:r>
-              <a:rPr lang="en-US" smtClean="0">
+              <a:rPr lang="en-US" dirty="0" smtClean="0">
                 <a:latin typeface="Myriad Pro" panose="020B0503030403020204" pitchFamily="34" charset="0"/>
               </a:rPr>
               <a:t>chain.</a:t>
@@ -10176,29 +10313,29 @@
               </a:lnSpc>
             </a:pPr>
             <a:r>
-              <a:rPr lang="en-US">
+              <a:rPr lang="en-US" dirty="0">
                 <a:latin typeface="Myriad Pro" panose="020B0503030403020204" pitchFamily="34" charset="0"/>
               </a:rPr>
               <a:t>Use “UNIT”s as genes.</a:t>
             </a:r>
             <a:br>
-              <a:rPr lang="en-US">
+              <a:rPr lang="en-US" dirty="0">
                 <a:latin typeface="Myriad Pro" panose="020B0503030403020204" pitchFamily="34" charset="0"/>
               </a:rPr>
             </a:br>
             <a:r>
-              <a:rPr lang="en-US">
+              <a:rPr lang="en-US" dirty="0">
                 <a:latin typeface="Myriad Pro" panose="020B0503030403020204" pitchFamily="34" charset="0"/>
               </a:rPr>
               <a:t>A music period is a combination of “UNIT”s,</a:t>
             </a:r>
             <a:br>
-              <a:rPr lang="en-US">
+              <a:rPr lang="en-US" dirty="0">
                 <a:latin typeface="Myriad Pro" panose="020B0503030403020204" pitchFamily="34" charset="0"/>
               </a:rPr>
             </a:br>
             <a:r>
-              <a:rPr lang="en-US">
+              <a:rPr lang="en-US" dirty="0">
                 <a:latin typeface="Myriad Pro" panose="020B0503030403020204" pitchFamily="34" charset="0"/>
               </a:rPr>
               <a:t>which can be regarded as a chromosome.</a:t>
@@ -10244,7 +10381,7 @@
               </a:lnSpc>
             </a:pPr>
             <a:r>
-              <a:rPr lang="en-US" altLang="zh-CN">
+              <a:rPr lang="en-US" altLang="zh-CN" dirty="0">
                 <a:latin typeface="Myriad Pro" panose="020B0503030403020204" pitchFamily="34" charset="0"/>
               </a:rPr>
               <a:t> a shorthand form of musical notation</a:t>
@@ -10257,7 +10394,7 @@
               </a:lnSpc>
             </a:pPr>
             <a:r>
-              <a:rPr lang="en-US" altLang="zh-CN">
+              <a:rPr lang="en-US" altLang="zh-CN" dirty="0">
                 <a:latin typeface="Myriad Pro" panose="020B0503030403020204" pitchFamily="34" charset="0"/>
               </a:rPr>
               <a:t>One part of Format Conversion</a:t>
@@ -12162,16 +12299,7 @@
                 </a:solidFill>
                 <a:latin typeface="Garamond" panose="02020404030301010803" pitchFamily="18" charset="0"/>
               </a:rPr>
-              <a:t>02</a:t>
-            </a:r>
-            <a:r>
-              <a:rPr lang="en-US" altLang="zh-CN" sz="2800" b="1" smtClean="0">
-                <a:solidFill>
-                  <a:schemeClr val="accent6"/>
-                </a:solidFill>
-                <a:latin typeface="Garamond" panose="02020404030301010803" pitchFamily="18" charset="0"/>
-              </a:rPr>
-              <a:t>. Technique</a:t>
+              <a:t>02. Technique</a:t>
             </a:r>
             <a:endParaRPr lang="zh-CN" altLang="en-US" sz="2800" b="1" dirty="0">
               <a:solidFill>
@@ -12268,22 +12396,13 @@
               </a:lnSpc>
             </a:pPr>
             <a:r>
-              <a:rPr lang="en-US" altLang="zh-CN" sz="2400" b="1" smtClean="0">
+              <a:rPr lang="en-US" altLang="zh-CN" sz="2400" b="1" dirty="0" smtClean="0">
                 <a:solidFill>
                   <a:schemeClr val="bg1"/>
                 </a:solidFill>
                 <a:latin typeface="Garamond" panose="02020404030301010803" pitchFamily="18" charset="0"/>
               </a:rPr>
-              <a:t>Front</a:t>
-            </a:r>
-            <a:r>
-              <a:rPr lang="en-US" altLang="zh-CN" sz="2400" b="1" smtClean="0">
-                <a:solidFill>
-                  <a:schemeClr val="bg1"/>
-                </a:solidFill>
-                <a:latin typeface="Garamond" panose="02020404030301010803" pitchFamily="18" charset="0"/>
-              </a:rPr>
-              <a:t>end</a:t>
+              <a:t>Front end</a:t>
             </a:r>
             <a:endParaRPr lang="zh-CN" altLang="en-US" sz="2400" b="1" dirty="0">
               <a:solidFill>
@@ -12318,309 +12437,6 @@
 </file>
 
 <file path=ppt/slides/slide7.xml><?xml version="1.0" encoding="utf-8"?>
-<p:sld xmlns:a="http://schemas.openxmlformats.org/drawingml/2006/main" xmlns:r="http://schemas.openxmlformats.org/officeDocument/2006/relationships" xmlns:p="http://schemas.openxmlformats.org/presentationml/2006/main">
-  <p:cSld>
-    <p:spTree>
-      <p:nvGrpSpPr>
-        <p:cNvPr id="1" name=""/>
-        <p:cNvGrpSpPr/>
-        <p:nvPr/>
-      </p:nvGrpSpPr>
-      <p:grpSpPr>
-        <a:xfrm>
-          <a:off x="0" y="0"/>
-          <a:ext cx="0" cy="0"/>
-          <a:chOff x="0" y="0"/>
-          <a:chExt cx="0" cy="0"/>
-        </a:xfrm>
-      </p:grpSpPr>
-      <p:pic>
-        <p:nvPicPr>
-          <p:cNvPr id="2" name="图片 1"/>
-          <p:cNvPicPr>
-            <a:picLocks noChangeAspect="1"/>
-          </p:cNvPicPr>
-          <p:nvPr/>
-        </p:nvPicPr>
-        <p:blipFill rotWithShape="1">
-          <a:blip r:embed="rId3" cstate="screen">
-            <a:extLst>
-              <a:ext uri="{28A0092B-C50C-407E-A947-70E740481C1C}">
-                <a14:useLocalDpi xmlns:a14="http://schemas.microsoft.com/office/drawing/2010/main"/>
-              </a:ext>
-            </a:extLst>
-          </a:blip>
-          <a:srcRect r="537" b="1009"/>
-          <a:stretch/>
-        </p:blipFill>
-        <p:spPr>
-          <a:xfrm flipH="1" flipV="1">
-            <a:off x="0" y="0"/>
-            <a:ext cx="6739951" cy="5137152"/>
-          </a:xfrm>
-          <a:prstGeom prst="rect">
-            <a:avLst/>
-          </a:prstGeom>
-        </p:spPr>
-      </p:pic>
-      <p:grpSp>
-        <p:nvGrpSpPr>
-          <p:cNvPr id="10" name="组合 9"/>
-          <p:cNvGrpSpPr/>
-          <p:nvPr/>
-        </p:nvGrpSpPr>
-        <p:grpSpPr>
-          <a:xfrm>
-            <a:off x="6961139" y="3469856"/>
-            <a:ext cx="4229043" cy="1667296"/>
-            <a:chOff x="6774102" y="2270541"/>
-            <a:chExt cx="4229043" cy="1667296"/>
-          </a:xfrm>
-        </p:grpSpPr>
-        <p:sp>
-          <p:nvSpPr>
-            <p:cNvPr id="3" name="矩形 2"/>
-            <p:cNvSpPr/>
-            <p:nvPr/>
-          </p:nvSpPr>
-          <p:spPr>
-            <a:xfrm>
-              <a:off x="6774102" y="3014507"/>
-              <a:ext cx="4229043" cy="923330"/>
-            </a:xfrm>
-            <a:prstGeom prst="rect">
-              <a:avLst/>
-            </a:prstGeom>
-          </p:spPr>
-          <p:txBody>
-            <a:bodyPr wrap="none">
-              <a:spAutoFit/>
-              <a:scene3d>
-                <a:camera prst="orthographicFront"/>
-                <a:lightRig rig="threePt" dir="t"/>
-              </a:scene3d>
-              <a:sp3d contourW="12700"/>
-            </a:bodyPr>
-            <a:lstStyle/>
-            <a:p>
-              <a:pPr algn="r"/>
-              <a:r>
-                <a:rPr lang="en-US" altLang="zh-CN" sz="5400" b="1" smtClean="0">
-                  <a:solidFill>
-                    <a:schemeClr val="accent1"/>
-                  </a:solidFill>
-                  <a:latin typeface="Garamond" panose="02020404030301010803" pitchFamily="18" charset="0"/>
-                </a:rPr>
-                <a:t>Demostration</a:t>
-              </a:r>
-              <a:endParaRPr lang="zh-CN" altLang="en-US" sz="5400" b="1" dirty="0">
-                <a:solidFill>
-                  <a:schemeClr val="accent1"/>
-                </a:solidFill>
-                <a:latin typeface="Garamond" panose="02020404030301010803" pitchFamily="18" charset="0"/>
-              </a:endParaRPr>
-            </a:p>
-          </p:txBody>
-        </p:sp>
-        <p:sp>
-          <p:nvSpPr>
-            <p:cNvPr id="4" name="矩形 3"/>
-            <p:cNvSpPr/>
-            <p:nvPr/>
-          </p:nvSpPr>
-          <p:spPr>
-            <a:xfrm>
-              <a:off x="8218215" y="2270541"/>
-              <a:ext cx="2784930" cy="923330"/>
-            </a:xfrm>
-            <a:prstGeom prst="rect">
-              <a:avLst/>
-            </a:prstGeom>
-          </p:spPr>
-          <p:txBody>
-            <a:bodyPr wrap="none">
-              <a:spAutoFit/>
-              <a:scene3d>
-                <a:camera prst="orthographicFront"/>
-                <a:lightRig rig="threePt" dir="t"/>
-              </a:scene3d>
-              <a:sp3d contourW="12700"/>
-            </a:bodyPr>
-            <a:lstStyle/>
-            <a:p>
-              <a:pPr algn="r"/>
-              <a:r>
-                <a:rPr lang="en-US" altLang="zh-CN" sz="5400" b="1" smtClean="0">
-                  <a:solidFill>
-                    <a:schemeClr val="accent1"/>
-                  </a:solidFill>
-                  <a:latin typeface="Garamond" panose="02020404030301010803" pitchFamily="18" charset="0"/>
-                </a:rPr>
-                <a:t>PART </a:t>
-              </a:r>
-              <a:r>
-                <a:rPr lang="en-US" altLang="zh-CN" sz="5400" b="1" smtClean="0">
-                  <a:solidFill>
-                    <a:schemeClr val="accent1"/>
-                  </a:solidFill>
-                  <a:latin typeface="Garamond" panose="02020404030301010803" pitchFamily="18" charset="0"/>
-                </a:rPr>
-                <a:t>03</a:t>
-              </a:r>
-              <a:endParaRPr lang="zh-CN" altLang="en-US" sz="5400" b="1" dirty="0">
-                <a:solidFill>
-                  <a:schemeClr val="accent1"/>
-                </a:solidFill>
-                <a:latin typeface="Garamond" panose="02020404030301010803" pitchFamily="18" charset="0"/>
-              </a:endParaRPr>
-            </a:p>
-          </p:txBody>
-        </p:sp>
-      </p:grpSp>
-      <p:cxnSp>
-        <p:nvCxnSpPr>
-          <p:cNvPr id="6" name="直接连接符 5"/>
-          <p:cNvCxnSpPr/>
-          <p:nvPr/>
-        </p:nvCxnSpPr>
-        <p:spPr>
-          <a:xfrm flipH="1">
-            <a:off x="4412673" y="1607127"/>
-            <a:ext cx="4218709" cy="3179618"/>
-          </a:xfrm>
-          <a:prstGeom prst="line">
-            <a:avLst/>
-          </a:prstGeom>
-        </p:spPr>
-        <p:style>
-          <a:lnRef idx="1">
-            <a:schemeClr val="accent1"/>
-          </a:lnRef>
-          <a:fillRef idx="0">
-            <a:schemeClr val="accent1"/>
-          </a:fillRef>
-          <a:effectRef idx="0">
-            <a:schemeClr val="accent1"/>
-          </a:effectRef>
-          <a:fontRef idx="minor">
-            <a:schemeClr val="tx1"/>
-          </a:fontRef>
-        </p:style>
-      </p:cxnSp>
-      <p:cxnSp>
-        <p:nvCxnSpPr>
-          <p:cNvPr id="7" name="直接连接符 6"/>
-          <p:cNvCxnSpPr/>
-          <p:nvPr/>
-        </p:nvCxnSpPr>
-        <p:spPr>
-          <a:xfrm flipH="1">
-            <a:off x="5202385" y="1129145"/>
-            <a:ext cx="4218709" cy="3179618"/>
-          </a:xfrm>
-          <a:prstGeom prst="line">
-            <a:avLst/>
-          </a:prstGeom>
-        </p:spPr>
-        <p:style>
-          <a:lnRef idx="1">
-            <a:schemeClr val="accent1"/>
-          </a:lnRef>
-          <a:fillRef idx="0">
-            <a:schemeClr val="accent1"/>
-          </a:fillRef>
-          <a:effectRef idx="0">
-            <a:schemeClr val="accent1"/>
-          </a:effectRef>
-          <a:fontRef idx="minor">
-            <a:schemeClr val="tx1"/>
-          </a:fontRef>
-        </p:style>
-      </p:cxnSp>
-      <p:cxnSp>
-        <p:nvCxnSpPr>
-          <p:cNvPr id="8" name="直接连接符 7"/>
-          <p:cNvCxnSpPr/>
-          <p:nvPr/>
-        </p:nvCxnSpPr>
-        <p:spPr>
-          <a:xfrm>
-            <a:off x="5597236" y="3131127"/>
-            <a:ext cx="1794164" cy="3366655"/>
-          </a:xfrm>
-          <a:prstGeom prst="line">
-            <a:avLst/>
-          </a:prstGeom>
-        </p:spPr>
-        <p:style>
-          <a:lnRef idx="1">
-            <a:schemeClr val="accent1"/>
-          </a:lnRef>
-          <a:fillRef idx="0">
-            <a:schemeClr val="accent1"/>
-          </a:fillRef>
-          <a:effectRef idx="0">
-            <a:schemeClr val="accent1"/>
-          </a:effectRef>
-          <a:fontRef idx="minor">
-            <a:schemeClr val="tx1"/>
-          </a:fontRef>
-        </p:style>
-      </p:cxnSp>
-      <p:cxnSp>
-        <p:nvCxnSpPr>
-          <p:cNvPr id="9" name="直接连接符 8"/>
-          <p:cNvCxnSpPr/>
-          <p:nvPr/>
-        </p:nvCxnSpPr>
-        <p:spPr>
-          <a:xfrm>
-            <a:off x="5703462" y="3469856"/>
-            <a:ext cx="1694865" cy="3180326"/>
-          </a:xfrm>
-          <a:prstGeom prst="line">
-            <a:avLst/>
-          </a:prstGeom>
-        </p:spPr>
-        <p:style>
-          <a:lnRef idx="1">
-            <a:schemeClr val="accent1"/>
-          </a:lnRef>
-          <a:fillRef idx="0">
-            <a:schemeClr val="accent1"/>
-          </a:fillRef>
-          <a:effectRef idx="0">
-            <a:schemeClr val="accent1"/>
-          </a:effectRef>
-          <a:fontRef idx="minor">
-            <a:schemeClr val="tx1"/>
-          </a:fontRef>
-        </p:style>
-      </p:cxnSp>
-    </p:spTree>
-    <p:extLst>
-      <p:ext uri="{BB962C8B-B14F-4D97-AF65-F5344CB8AC3E}">
-        <p14:creationId xmlns:p14="http://schemas.microsoft.com/office/powerpoint/2010/main" val="1359616642"/>
-      </p:ext>
-    </p:extLst>
-  </p:cSld>
-  <p:clrMapOvr>
-    <a:masterClrMapping/>
-  </p:clrMapOvr>
-  <p:transition spd="slow">
-    <p:push dir="u"/>
-  </p:transition>
-  <p:timing>
-    <p:tnLst>
-      <p:par>
-        <p:cTn id="1" dur="indefinite" restart="never" nodeType="tmRoot"/>
-      </p:par>
-    </p:tnLst>
-  </p:timing>
-</p:sld>
-</file>
-
-<file path=ppt/slides/slide8.xml><?xml version="1.0" encoding="utf-8"?>
 <p:sld xmlns:a="http://schemas.openxmlformats.org/drawingml/2006/main" xmlns:r="http://schemas.openxmlformats.org/officeDocument/2006/relationships" xmlns:p="http://schemas.openxmlformats.org/presentationml/2006/main">
   <p:cSld>
     <p:spTree>
@@ -12753,7 +12569,7 @@
             <a:p>
               <a:pPr algn="r"/>
               <a:r>
-                <a:rPr lang="en-US" altLang="zh-CN" sz="5400" b="1" smtClean="0">
+                <a:rPr lang="en-US" altLang="zh-CN" sz="5400" b="1" dirty="0" smtClean="0">
                   <a:solidFill>
                     <a:schemeClr val="accent1"/>
                   </a:solidFill>
@@ -12762,13 +12578,13 @@
                 <a:t>PART </a:t>
               </a:r>
               <a:r>
-                <a:rPr lang="en-US" altLang="zh-CN" sz="5400" b="1" smtClean="0">
+                <a:rPr lang="en-US" altLang="zh-CN" sz="5400" b="1" dirty="0" smtClean="0">
                   <a:solidFill>
                     <a:schemeClr val="accent1"/>
                   </a:solidFill>
                   <a:latin typeface="Garamond" panose="02020404030301010803" pitchFamily="18" charset="0"/>
                 </a:rPr>
-                <a:t>04</a:t>
+                <a:t>03</a:t>
               </a:r>
               <a:endParaRPr lang="zh-CN" altLang="en-US" sz="5400" b="1" dirty="0">
                 <a:solidFill>
@@ -12923,7 +12739,7 @@
 </p:sld>
 </file>
 
-<file path=ppt/slides/slide9.xml><?xml version="1.0" encoding="utf-8"?>
+<file path=ppt/slides/slide8.xml><?xml version="1.0" encoding="utf-8"?>
 <p:sld xmlns:a="http://schemas.openxmlformats.org/drawingml/2006/main" xmlns:r="http://schemas.openxmlformats.org/officeDocument/2006/relationships" xmlns:p="http://schemas.openxmlformats.org/presentationml/2006/main">
   <p:cSld>
     <p:spTree>
@@ -19066,10 +18882,10 @@
         </p:nvGrpSpPr>
         <p:grpSpPr>
           <a:xfrm>
-            <a:off x="1057480" y="4638118"/>
-            <a:ext cx="3105898" cy="1339454"/>
-            <a:chOff x="1057480" y="4638118"/>
-            <a:chExt cx="3105898" cy="1339454"/>
+            <a:off x="1057480" y="4621849"/>
+            <a:ext cx="3105898" cy="1355723"/>
+            <a:chOff x="1057480" y="4621849"/>
+            <a:chExt cx="3105898" cy="1355723"/>
           </a:xfrm>
         </p:grpSpPr>
         <p:sp>
@@ -19100,7 +18916,7 @@
             <a:p>
               <a:pPr algn="ctr" fontAlgn="base"/>
               <a:r>
-                <a:rPr lang="en-US" smtClean="0">
+                <a:rPr lang="en-US" dirty="0" smtClean="0">
                   <a:solidFill>
                     <a:schemeClr val="tx1">
                       <a:lumMod val="75000"/>
@@ -19112,7 +18928,7 @@
                 <a:t>User can enter his thoughts in </a:t>
               </a:r>
               <a:r>
-                <a:rPr lang="en-US">
+                <a:rPr lang="en-US" dirty="0">
                   <a:solidFill>
                     <a:schemeClr val="tx1">
                       <a:lumMod val="75000"/>
@@ -19121,22 +18937,10 @@
                   </a:solidFill>
                   <a:latin typeface="Myriad Pro" panose="020B0503030403020204" pitchFamily="34" charset="0"/>
                 </a:rPr>
-                <a:t>numbered musical notations </a:t>
+                <a:t>numbered musical notations by </a:t>
               </a:r>
               <a:r>
-                <a:rPr lang="en-US">
-                  <a:solidFill>
-                    <a:schemeClr val="tx1">
-                      <a:lumMod val="75000"/>
-                      <a:lumOff val="25000"/>
-                    </a:schemeClr>
-                  </a:solidFill>
-                  <a:latin typeface="Myriad Pro" panose="020B0503030403020204" pitchFamily="34" charset="0"/>
-                </a:rPr>
-                <a:t>by </a:t>
-              </a:r>
-              <a:r>
-                <a:rPr lang="en-US" smtClean="0">
+                <a:rPr lang="en-US" dirty="0" smtClean="0">
                   <a:solidFill>
                     <a:schemeClr val="tx1">
                       <a:lumMod val="75000"/>
@@ -19147,7 +18951,7 @@
                 </a:rPr>
                 <a:t>keyboard.</a:t>
               </a:r>
-              <a:endParaRPr lang="en-US" b="1">
+              <a:endParaRPr lang="en-US" b="1" dirty="0">
                 <a:solidFill>
                   <a:schemeClr val="tx1">
                     <a:lumMod val="75000"/>
@@ -19167,8 +18971,8 @@
           </p:nvSpPr>
           <p:spPr>
             <a:xfrm>
-              <a:off x="1489442" y="4638118"/>
-              <a:ext cx="2241974" cy="401264"/>
+              <a:off x="1329116" y="4621849"/>
+              <a:ext cx="2560834" cy="498598"/>
             </a:xfrm>
             <a:prstGeom prst="rect">
               <a:avLst/>
@@ -19191,7 +18995,7 @@
                 </a:lnSpc>
               </a:pPr>
               <a:r>
-                <a:rPr lang="en-US" altLang="zh-CN" b="1" smtClean="0">
+                <a:rPr lang="en-US" altLang="zh-CN" sz="2200" b="1" dirty="0" smtClean="0">
                   <a:solidFill>
                     <a:schemeClr val="tx1">
                       <a:lumMod val="65000"/>
@@ -19202,7 +19006,7 @@
                 </a:rPr>
                 <a:t>Allow User’s Input</a:t>
               </a:r>
-              <a:endParaRPr lang="zh-CN" altLang="en-US" b="1" dirty="0">
+              <a:endParaRPr lang="zh-CN" altLang="en-US" sz="2200" b="1" dirty="0">
                 <a:solidFill>
                   <a:schemeClr val="tx1">
                     <a:lumMod val="65000"/>
@@ -19223,10 +19027,10 @@
         </p:nvGrpSpPr>
         <p:grpSpPr>
           <a:xfrm>
-            <a:off x="4527018" y="4638118"/>
-            <a:ext cx="3121931" cy="1142733"/>
-            <a:chOff x="4527018" y="4638118"/>
-            <a:chExt cx="3121931" cy="1142733"/>
+            <a:off x="4345198" y="4643579"/>
+            <a:ext cx="3503397" cy="1167793"/>
+            <a:chOff x="4345198" y="4643579"/>
+            <a:chExt cx="3503397" cy="1167793"/>
           </a:xfrm>
         </p:grpSpPr>
         <p:sp>
@@ -19238,7 +19042,7 @@
           <p:spPr>
             <a:xfrm>
               <a:off x="4543051" y="5054242"/>
-              <a:ext cx="3105898" cy="726609"/>
+              <a:ext cx="3002968" cy="757130"/>
             </a:xfrm>
             <a:prstGeom prst="rect">
               <a:avLst/>
@@ -19261,7 +19065,7 @@
                 </a:lnSpc>
               </a:pPr>
               <a:r>
-                <a:rPr lang="en-US" altLang="zh-CN">
+                <a:rPr lang="en-US" altLang="zh-CN" dirty="0" smtClean="0">
                   <a:solidFill>
                     <a:schemeClr val="tx1">
                       <a:lumMod val="75000"/>
@@ -19270,10 +19074,10 @@
                   </a:solidFill>
                   <a:latin typeface="Myriad Pro" panose="020B0503030403020204" pitchFamily="34" charset="0"/>
                 </a:rPr>
-                <a:t>Develop the logic of </a:t>
+                <a:t>Optimized </a:t>
               </a:r>
               <a:r>
-                <a:rPr lang="en-US" altLang="zh-CN">
+                <a:rPr lang="en-US" altLang="zh-CN" dirty="0">
                   <a:solidFill>
                     <a:schemeClr val="tx1">
                       <a:lumMod val="75000"/>
@@ -19282,19 +19086,7 @@
                   </a:solidFill>
                   <a:latin typeface="Myriad Pro" panose="020B0503030403020204" pitchFamily="34" charset="0"/>
                 </a:rPr>
-                <a:t>generating</a:t>
-              </a:r>
-              <a:r>
-                <a:rPr lang="en-US" altLang="zh-CN">
-                  <a:solidFill>
-                    <a:schemeClr val="tx1">
-                      <a:lumMod val="75000"/>
-                      <a:lumOff val="25000"/>
-                    </a:schemeClr>
-                  </a:solidFill>
-                  <a:latin typeface="Myriad Pro" panose="020B0503030403020204" pitchFamily="34" charset="0"/>
-                </a:rPr>
-                <a:t>.</a:t>
+                <a:t>the logic of generating.</a:t>
               </a:r>
               <a:endParaRPr lang="zh-CN" altLang="en-US" dirty="0">
                 <a:solidFill>
@@ -19316,8 +19108,8 @@
           </p:nvSpPr>
           <p:spPr>
             <a:xfrm>
-              <a:off x="4527018" y="4638118"/>
-              <a:ext cx="3121931" cy="397545"/>
+              <a:off x="4345198" y="4643579"/>
+              <a:ext cx="3503397" cy="498598"/>
             </a:xfrm>
             <a:prstGeom prst="rect">
               <a:avLst/>
@@ -19340,7 +19132,7 @@
                 </a:lnSpc>
               </a:pPr>
               <a:r>
-                <a:rPr lang="en-US" altLang="zh-CN" b="1" smtClean="0">
+                <a:rPr lang="en-US" altLang="zh-CN" sz="2200" b="1" dirty="0" smtClean="0">
                   <a:solidFill>
                     <a:schemeClr val="tx1">
                       <a:lumMod val="65000"/>
@@ -19351,7 +19143,7 @@
                 </a:rPr>
                 <a:t>Improve Generation Model</a:t>
               </a:r>
-              <a:endParaRPr lang="zh-CN" altLang="en-US" b="1" dirty="0">
+              <a:endParaRPr lang="zh-CN" altLang="en-US" sz="2200" b="1" dirty="0">
                 <a:solidFill>
                   <a:schemeClr val="tx1">
                     <a:lumMod val="65000"/>
@@ -19373,9 +19165,9 @@
         <p:grpSpPr>
           <a:xfrm>
             <a:off x="8030415" y="4638118"/>
-            <a:ext cx="3105898" cy="1475132"/>
+            <a:ext cx="3105898" cy="1505653"/>
             <a:chOff x="8030415" y="4638118"/>
-            <a:chExt cx="3105898" cy="1475132"/>
+            <a:chExt cx="3105898" cy="1505653"/>
           </a:xfrm>
         </p:grpSpPr>
         <p:sp>
@@ -19387,7 +19179,7 @@
           <p:spPr>
             <a:xfrm>
               <a:off x="8030415" y="5054242"/>
-              <a:ext cx="3105898" cy="1059008"/>
+              <a:ext cx="3105898" cy="1089529"/>
             </a:xfrm>
             <a:prstGeom prst="rect">
               <a:avLst/>
@@ -19410,7 +19202,7 @@
                 </a:lnSpc>
               </a:pPr>
               <a:r>
-                <a:rPr lang="en-US" altLang="zh-CN">
+                <a:rPr lang="en-US" altLang="zh-CN" dirty="0" smtClean="0">
                   <a:solidFill>
                     <a:schemeClr val="tx1">
                       <a:lumMod val="75000"/>
@@ -19419,8 +19211,53 @@
                   </a:solidFill>
                   <a:latin typeface="Myriad Pro" panose="020B0503030403020204" pitchFamily="34" charset="0"/>
                 </a:rPr>
-                <a:t>Art style is changed.</a:t>
+                <a:t>Art </a:t>
               </a:r>
+              <a:r>
+                <a:rPr lang="en-US" altLang="zh-CN" dirty="0">
+                  <a:solidFill>
+                    <a:schemeClr val="tx1">
+                      <a:lumMod val="75000"/>
+                      <a:lumOff val="25000"/>
+                    </a:schemeClr>
+                  </a:solidFill>
+                  <a:latin typeface="Myriad Pro" panose="020B0503030403020204" pitchFamily="34" charset="0"/>
+                </a:rPr>
+                <a:t>style </a:t>
+              </a:r>
+              <a:r>
+                <a:rPr lang="en-US" altLang="zh-CN" dirty="0" smtClean="0">
+                  <a:solidFill>
+                    <a:schemeClr val="tx1">
+                      <a:lumMod val="75000"/>
+                      <a:lumOff val="25000"/>
+                    </a:schemeClr>
+                  </a:solidFill>
+                  <a:latin typeface="Myriad Pro" panose="020B0503030403020204" pitchFamily="34" charset="0"/>
+                </a:rPr>
+                <a:t>modification</a:t>
+              </a:r>
+              <a:r>
+                <a:rPr lang="en-US" altLang="zh-CN" dirty="0" smtClean="0">
+                  <a:solidFill>
+                    <a:schemeClr val="tx1">
+                      <a:lumMod val="75000"/>
+                      <a:lumOff val="25000"/>
+                    </a:schemeClr>
+                  </a:solidFill>
+                  <a:latin typeface="Myriad Pro" panose="020B0503030403020204" pitchFamily="34" charset="0"/>
+                </a:rPr>
+                <a:t>.</a:t>
+              </a:r>
+              <a:endParaRPr lang="en-US" altLang="zh-CN" dirty="0">
+                <a:solidFill>
+                  <a:schemeClr val="tx1">
+                    <a:lumMod val="75000"/>
+                    <a:lumOff val="25000"/>
+                  </a:schemeClr>
+                </a:solidFill>
+                <a:latin typeface="Myriad Pro" panose="020B0503030403020204" pitchFamily="34" charset="0"/>
+              </a:endParaRPr>
             </a:p>
             <a:p>
               <a:pPr algn="ctr">
@@ -19429,7 +19266,7 @@
                 </a:lnSpc>
               </a:pPr>
               <a:r>
-                <a:rPr lang="en-US" altLang="zh-CN">
+                <a:rPr lang="en-US" altLang="zh-CN" dirty="0">
                   <a:solidFill>
                     <a:schemeClr val="tx1">
                       <a:lumMod val="75000"/>
@@ -19448,7 +19285,7 @@
                 </a:lnSpc>
               </a:pPr>
               <a:r>
-                <a:rPr lang="en-US" altLang="zh-CN">
+                <a:rPr lang="en-US" altLang="zh-CN" dirty="0">
                   <a:solidFill>
                     <a:schemeClr val="tx1">
                       <a:lumMod val="75000"/>
@@ -19457,7 +19294,19 @@
                   </a:solidFill>
                   <a:latin typeface="Myriad Pro" panose="020B0503030403020204" pitchFamily="34" charset="0"/>
                 </a:rPr>
-                <a:t>Layout is improved.</a:t>
+                <a:t>Layout </a:t>
+              </a:r>
+              <a:r>
+                <a:rPr lang="en-US" altLang="zh-CN" dirty="0" smtClean="0">
+                  <a:solidFill>
+                    <a:schemeClr val="tx1">
+                      <a:lumMod val="75000"/>
+                      <a:lumOff val="25000"/>
+                    </a:schemeClr>
+                  </a:solidFill>
+                  <a:latin typeface="Myriad Pro" panose="020B0503030403020204" pitchFamily="34" charset="0"/>
+                </a:rPr>
+                <a:t>improvement.</a:t>
               </a:r>
               <a:endParaRPr lang="zh-CN" altLang="en-US" dirty="0">
                 <a:solidFill>
@@ -19480,7 +19329,7 @@
           <p:spPr>
             <a:xfrm>
               <a:off x="8125691" y="4638118"/>
-              <a:ext cx="3010622" cy="397545"/>
+              <a:ext cx="3010622" cy="498598"/>
             </a:xfrm>
             <a:prstGeom prst="rect">
               <a:avLst/>
@@ -19503,7 +19352,7 @@
                 </a:lnSpc>
               </a:pPr>
               <a:r>
-                <a:rPr lang="en-US" altLang="zh-CN" b="1" smtClean="0">
+                <a:rPr lang="en-US" altLang="zh-CN" sz="2200" b="1" dirty="0" smtClean="0">
                   <a:solidFill>
                     <a:schemeClr val="tx1">
                       <a:lumMod val="65000"/>
@@ -19514,7 +19363,7 @@
                 </a:rPr>
                 <a:t>Re-design Home Page</a:t>
               </a:r>
-              <a:endParaRPr lang="zh-CN" altLang="en-US" b="1" dirty="0">
+              <a:endParaRPr lang="zh-CN" altLang="en-US" sz="2200" b="1" dirty="0">
                 <a:solidFill>
                   <a:schemeClr val="tx1">
                     <a:lumMod val="65000"/>
@@ -19590,16 +19439,7 @@
                 </a:solidFill>
                 <a:latin typeface="Garamond" panose="02020404030301010803" pitchFamily="18" charset="0"/>
               </a:rPr>
-              <a:t>04</a:t>
-            </a:r>
-            <a:r>
-              <a:rPr lang="en-US" altLang="zh-CN" sz="2800" b="1" smtClean="0">
-                <a:solidFill>
-                  <a:schemeClr val="accent6"/>
-                </a:solidFill>
-                <a:latin typeface="Garamond" panose="02020404030301010803" pitchFamily="18" charset="0"/>
-              </a:rPr>
-              <a:t>. Development</a:t>
+              <a:t>04. Development</a:t>
             </a:r>
             <a:endParaRPr lang="zh-CN" altLang="en-US" sz="2800" b="1" dirty="0">
               <a:solidFill>
@@ -19614,6 +19454,309 @@
     <p:extLst>
       <p:ext uri="{BB962C8B-B14F-4D97-AF65-F5344CB8AC3E}">
         <p14:creationId xmlns:p14="http://schemas.microsoft.com/office/powerpoint/2010/main" val="3660962460"/>
+      </p:ext>
+    </p:extLst>
+  </p:cSld>
+  <p:clrMapOvr>
+    <a:masterClrMapping/>
+  </p:clrMapOvr>
+  <p:transition spd="slow">
+    <p:push dir="u"/>
+  </p:transition>
+  <p:timing>
+    <p:tnLst>
+      <p:par>
+        <p:cTn id="1" dur="indefinite" restart="never" nodeType="tmRoot"/>
+      </p:par>
+    </p:tnLst>
+  </p:timing>
+</p:sld>
+</file>
+
+<file path=ppt/slides/slide9.xml><?xml version="1.0" encoding="utf-8"?>
+<p:sld xmlns:a="http://schemas.openxmlformats.org/drawingml/2006/main" xmlns:r="http://schemas.openxmlformats.org/officeDocument/2006/relationships" xmlns:p="http://schemas.openxmlformats.org/presentationml/2006/main">
+  <p:cSld>
+    <p:spTree>
+      <p:nvGrpSpPr>
+        <p:cNvPr id="1" name=""/>
+        <p:cNvGrpSpPr/>
+        <p:nvPr/>
+      </p:nvGrpSpPr>
+      <p:grpSpPr>
+        <a:xfrm>
+          <a:off x="0" y="0"/>
+          <a:ext cx="0" cy="0"/>
+          <a:chOff x="0" y="0"/>
+          <a:chExt cx="0" cy="0"/>
+        </a:xfrm>
+      </p:grpSpPr>
+      <p:pic>
+        <p:nvPicPr>
+          <p:cNvPr id="2" name="图片 1"/>
+          <p:cNvPicPr>
+            <a:picLocks noChangeAspect="1"/>
+          </p:cNvPicPr>
+          <p:nvPr/>
+        </p:nvPicPr>
+        <p:blipFill rotWithShape="1">
+          <a:blip r:embed="rId3" cstate="screen">
+            <a:extLst>
+              <a:ext uri="{28A0092B-C50C-407E-A947-70E740481C1C}">
+                <a14:useLocalDpi xmlns:a14="http://schemas.microsoft.com/office/drawing/2010/main"/>
+              </a:ext>
+            </a:extLst>
+          </a:blip>
+          <a:srcRect r="537" b="1009"/>
+          <a:stretch/>
+        </p:blipFill>
+        <p:spPr>
+          <a:xfrm flipH="1" flipV="1">
+            <a:off x="0" y="0"/>
+            <a:ext cx="6739951" cy="5137152"/>
+          </a:xfrm>
+          <a:prstGeom prst="rect">
+            <a:avLst/>
+          </a:prstGeom>
+        </p:spPr>
+      </p:pic>
+      <p:grpSp>
+        <p:nvGrpSpPr>
+          <p:cNvPr id="10" name="组合 9"/>
+          <p:cNvGrpSpPr/>
+          <p:nvPr/>
+        </p:nvGrpSpPr>
+        <p:grpSpPr>
+          <a:xfrm>
+            <a:off x="6961139" y="3469856"/>
+            <a:ext cx="4229043" cy="1667296"/>
+            <a:chOff x="6774102" y="2270541"/>
+            <a:chExt cx="4229043" cy="1667296"/>
+          </a:xfrm>
+        </p:grpSpPr>
+        <p:sp>
+          <p:nvSpPr>
+            <p:cNvPr id="3" name="矩形 2"/>
+            <p:cNvSpPr/>
+            <p:nvPr/>
+          </p:nvSpPr>
+          <p:spPr>
+            <a:xfrm>
+              <a:off x="6774102" y="3014507"/>
+              <a:ext cx="4229043" cy="923330"/>
+            </a:xfrm>
+            <a:prstGeom prst="rect">
+              <a:avLst/>
+            </a:prstGeom>
+          </p:spPr>
+          <p:txBody>
+            <a:bodyPr wrap="none">
+              <a:spAutoFit/>
+              <a:scene3d>
+                <a:camera prst="orthographicFront"/>
+                <a:lightRig rig="threePt" dir="t"/>
+              </a:scene3d>
+              <a:sp3d contourW="12700"/>
+            </a:bodyPr>
+            <a:lstStyle/>
+            <a:p>
+              <a:pPr algn="r"/>
+              <a:r>
+                <a:rPr lang="en-US" altLang="zh-CN" sz="5400" b="1" smtClean="0">
+                  <a:solidFill>
+                    <a:schemeClr val="accent1"/>
+                  </a:solidFill>
+                  <a:latin typeface="Garamond" panose="02020404030301010803" pitchFamily="18" charset="0"/>
+                </a:rPr>
+                <a:t>Demostration</a:t>
+              </a:r>
+              <a:endParaRPr lang="zh-CN" altLang="en-US" sz="5400" b="1" dirty="0">
+                <a:solidFill>
+                  <a:schemeClr val="accent1"/>
+                </a:solidFill>
+                <a:latin typeface="Garamond" panose="02020404030301010803" pitchFamily="18" charset="0"/>
+              </a:endParaRPr>
+            </a:p>
+          </p:txBody>
+        </p:sp>
+        <p:sp>
+          <p:nvSpPr>
+            <p:cNvPr id="4" name="矩形 3"/>
+            <p:cNvSpPr/>
+            <p:nvPr/>
+          </p:nvSpPr>
+          <p:spPr>
+            <a:xfrm>
+              <a:off x="8218215" y="2270541"/>
+              <a:ext cx="2784930" cy="923330"/>
+            </a:xfrm>
+            <a:prstGeom prst="rect">
+              <a:avLst/>
+            </a:prstGeom>
+          </p:spPr>
+          <p:txBody>
+            <a:bodyPr wrap="none">
+              <a:spAutoFit/>
+              <a:scene3d>
+                <a:camera prst="orthographicFront"/>
+                <a:lightRig rig="threePt" dir="t"/>
+              </a:scene3d>
+              <a:sp3d contourW="12700"/>
+            </a:bodyPr>
+            <a:lstStyle/>
+            <a:p>
+              <a:pPr algn="r"/>
+              <a:r>
+                <a:rPr lang="en-US" altLang="zh-CN" sz="5400" b="1" dirty="0" smtClean="0">
+                  <a:solidFill>
+                    <a:schemeClr val="accent1"/>
+                  </a:solidFill>
+                  <a:latin typeface="Garamond" panose="02020404030301010803" pitchFamily="18" charset="0"/>
+                </a:rPr>
+                <a:t>PART </a:t>
+              </a:r>
+              <a:r>
+                <a:rPr lang="en-US" altLang="zh-CN" sz="5400" b="1" dirty="0" smtClean="0">
+                  <a:solidFill>
+                    <a:schemeClr val="accent1"/>
+                  </a:solidFill>
+                  <a:latin typeface="Garamond" panose="02020404030301010803" pitchFamily="18" charset="0"/>
+                </a:rPr>
+                <a:t>04</a:t>
+              </a:r>
+              <a:endParaRPr lang="zh-CN" altLang="en-US" sz="5400" b="1" dirty="0">
+                <a:solidFill>
+                  <a:schemeClr val="accent1"/>
+                </a:solidFill>
+                <a:latin typeface="Garamond" panose="02020404030301010803" pitchFamily="18" charset="0"/>
+              </a:endParaRPr>
+            </a:p>
+          </p:txBody>
+        </p:sp>
+      </p:grpSp>
+      <p:cxnSp>
+        <p:nvCxnSpPr>
+          <p:cNvPr id="6" name="直接连接符 5"/>
+          <p:cNvCxnSpPr/>
+          <p:nvPr/>
+        </p:nvCxnSpPr>
+        <p:spPr>
+          <a:xfrm flipH="1">
+            <a:off x="4412673" y="1607127"/>
+            <a:ext cx="4218709" cy="3179618"/>
+          </a:xfrm>
+          <a:prstGeom prst="line">
+            <a:avLst/>
+          </a:prstGeom>
+        </p:spPr>
+        <p:style>
+          <a:lnRef idx="1">
+            <a:schemeClr val="accent1"/>
+          </a:lnRef>
+          <a:fillRef idx="0">
+            <a:schemeClr val="accent1"/>
+          </a:fillRef>
+          <a:effectRef idx="0">
+            <a:schemeClr val="accent1"/>
+          </a:effectRef>
+          <a:fontRef idx="minor">
+            <a:schemeClr val="tx1"/>
+          </a:fontRef>
+        </p:style>
+      </p:cxnSp>
+      <p:cxnSp>
+        <p:nvCxnSpPr>
+          <p:cNvPr id="7" name="直接连接符 6"/>
+          <p:cNvCxnSpPr/>
+          <p:nvPr/>
+        </p:nvCxnSpPr>
+        <p:spPr>
+          <a:xfrm flipH="1">
+            <a:off x="5202385" y="1129145"/>
+            <a:ext cx="4218709" cy="3179618"/>
+          </a:xfrm>
+          <a:prstGeom prst="line">
+            <a:avLst/>
+          </a:prstGeom>
+        </p:spPr>
+        <p:style>
+          <a:lnRef idx="1">
+            <a:schemeClr val="accent1"/>
+          </a:lnRef>
+          <a:fillRef idx="0">
+            <a:schemeClr val="accent1"/>
+          </a:fillRef>
+          <a:effectRef idx="0">
+            <a:schemeClr val="accent1"/>
+          </a:effectRef>
+          <a:fontRef idx="minor">
+            <a:schemeClr val="tx1"/>
+          </a:fontRef>
+        </p:style>
+      </p:cxnSp>
+      <p:cxnSp>
+        <p:nvCxnSpPr>
+          <p:cNvPr id="8" name="直接连接符 7"/>
+          <p:cNvCxnSpPr/>
+          <p:nvPr/>
+        </p:nvCxnSpPr>
+        <p:spPr>
+          <a:xfrm>
+            <a:off x="5597236" y="3131127"/>
+            <a:ext cx="1794164" cy="3366655"/>
+          </a:xfrm>
+          <a:prstGeom prst="line">
+            <a:avLst/>
+          </a:prstGeom>
+        </p:spPr>
+        <p:style>
+          <a:lnRef idx="1">
+            <a:schemeClr val="accent1"/>
+          </a:lnRef>
+          <a:fillRef idx="0">
+            <a:schemeClr val="accent1"/>
+          </a:fillRef>
+          <a:effectRef idx="0">
+            <a:schemeClr val="accent1"/>
+          </a:effectRef>
+          <a:fontRef idx="minor">
+            <a:schemeClr val="tx1"/>
+          </a:fontRef>
+        </p:style>
+      </p:cxnSp>
+      <p:cxnSp>
+        <p:nvCxnSpPr>
+          <p:cNvPr id="9" name="直接连接符 8"/>
+          <p:cNvCxnSpPr/>
+          <p:nvPr/>
+        </p:nvCxnSpPr>
+        <p:spPr>
+          <a:xfrm>
+            <a:off x="5703462" y="3469856"/>
+            <a:ext cx="1694865" cy="3180326"/>
+          </a:xfrm>
+          <a:prstGeom prst="line">
+            <a:avLst/>
+          </a:prstGeom>
+        </p:spPr>
+        <p:style>
+          <a:lnRef idx="1">
+            <a:schemeClr val="accent1"/>
+          </a:lnRef>
+          <a:fillRef idx="0">
+            <a:schemeClr val="accent1"/>
+          </a:fillRef>
+          <a:effectRef idx="0">
+            <a:schemeClr val="accent1"/>
+          </a:effectRef>
+          <a:fontRef idx="minor">
+            <a:schemeClr val="tx1"/>
+          </a:fontRef>
+        </p:style>
+      </p:cxnSp>
+    </p:spTree>
+    <p:extLst>
+      <p:ext uri="{BB962C8B-B14F-4D97-AF65-F5344CB8AC3E}">
+        <p14:creationId xmlns:p14="http://schemas.microsoft.com/office/powerpoint/2010/main" val="1359616642"/>
       </p:ext>
     </p:extLst>
   </p:cSld>

</xml_diff>